<commit_message>
feat: generating certificates with database dat
</commit_message>
<xml_diff>
--- a/src/assets/generated/Constancia de participacion_Plantilla.pptx
+++ b/src/assets/generated/Constancia de participacion_Plantilla.pptx
@@ -1,26 +1,26 @@
 
 <file path=ppt/presentation.xml><?xml version="1.0" encoding="utf-8"?>
-<p:presentation xmlns:a="http://schemas.openxmlformats.org/drawingml/2006/main" xmlns:r="http://schemas.openxmlformats.org/officeDocument/2006/relationships" xmlns:p="http://schemas.openxmlformats.org/presentationml/2006/main" saveSubsetFonts="1" embedTrueTypeFonts="true">
+<p:presentation xmlns:a="http://schemas.openxmlformats.org/drawingml/2006/main" xmlns:r="http://schemas.openxmlformats.org/officeDocument/2006/relationships" xmlns:p="http://schemas.openxmlformats.org/presentationml/2006/main" embedTrueTypeFonts="1" saveSubsetFonts="1">
   <p:sldMasterIdLst>
     <p:sldMasterId id="2147483648" r:id="rId1"/>
   </p:sldMasterIdLst>
   <p:sldIdLst>
-    <p:sldId id="256" r:id="rId6"/>
+    <p:sldId id="256" r:id="rId2"/>
   </p:sldIdLst>
   <p:sldSz cx="10693400" cy="7556500"/>
   <p:notesSz cx="6858000" cy="9144000"/>
   <p:embeddedFontLst>
     <p:embeddedFont>
-      <p:font typeface="Tex Gyre Termes" charset="1" panose="00000500000000000000"/>
-      <p:regular r:id="rId7"/>
+      <p:font typeface="Asangha" panose="020B0604020202020204" charset="-34"/>
+      <p:regular r:id="rId3"/>
     </p:embeddedFont>
     <p:embeddedFont>
-      <p:font typeface="Tex Gyre Termes Bold" charset="1" panose="00000800000000000000"/>
-      <p:regular r:id="rId8"/>
+      <p:font typeface="Tex Gyre Termes" panose="020B0604020202020204" charset="0"/>
+      <p:regular r:id="rId4"/>
     </p:embeddedFont>
     <p:embeddedFont>
-      <p:font typeface="Asangha" charset="1" panose="00000000000000000000"/>
-      <p:regular r:id="rId9"/>
+      <p:font typeface="Tex Gyre Termes Bold" panose="020B0604020202020204" charset="0"/>
+      <p:regular r:id="rId5"/>
     </p:embeddedFont>
   </p:embeddedFontLst>
   <p:defaultTextStyle>
@@ -118,6 +118,22 @@
       </a:defRPr>
     </a:lvl9pPr>
   </p:defaultTextStyle>
+  <p:extLst>
+    <p:ext uri="{EFAFB233-063F-42B5-8137-9DF3F51BA10A}">
+      <p15:sldGuideLst xmlns:p15="http://schemas.microsoft.com/office/powerpoint/2012/main">
+        <p15:guide id="1" orient="horz" pos="2160">
+          <p15:clr>
+            <a:srgbClr val="A4A3A4"/>
+          </p15:clr>
+        </p15:guide>
+        <p15:guide id="2" pos="2880">
+          <p15:clr>
+            <a:srgbClr val="A4A3A4"/>
+          </p15:clr>
+        </p15:guide>
+      </p15:sldGuideLst>
+    </p:ext>
+  </p:extLst>
 </p:presentation>
 </file>
 
@@ -159,10 +175,9 @@
           <a:lstStyle/>
           <a:p>
             <a:r>
-              <a:rPr lang="en-US" smtClean="0"/>
+              <a:rPr lang="en-US"/>
               <a:t>Click to edit Master title style</a:t>
             </a:r>
-            <a:endParaRPr lang="en-US"/>
           </a:p>
         </p:txBody>
       </p:sp>
@@ -278,10 +293,9 @@
           </a:lstStyle>
           <a:p>
             <a:r>
-              <a:rPr lang="en-US" smtClean="0"/>
+              <a:rPr lang="en-US"/>
               <a:t>Click to edit Master subtitle style</a:t>
             </a:r>
-            <a:endParaRPr lang="en-US"/>
           </a:p>
         </p:txBody>
       </p:sp>
@@ -303,7 +317,7 @@
             <a:fld id="{1D8BD707-D9CF-40AE-B4C6-C98DA3205C09}" type="datetimeFigureOut">
               <a:rPr lang="en-US" smtClean="0"/>
               <a:pPr/>
-              <a:t>8/1/2011</a:t>
+              <a:t>5/25/2025</a:t>
             </a:fld>
             <a:endParaRPr lang="en-US"/>
           </a:p>
@@ -346,7 +360,7 @@
             <a:fld id="{B6F15528-21DE-4FAA-801E-634DDDAF4B2B}" type="slidenum">
               <a:rPr lang="en-US" smtClean="0"/>
               <a:pPr/>
-              <a:t>‹#›</a:t>
+              <a:t>‹Nº›</a:t>
             </a:fld>
             <a:endParaRPr lang="en-US"/>
           </a:p>
@@ -393,10 +407,9 @@
           <a:lstStyle/>
           <a:p>
             <a:r>
-              <a:rPr lang="en-US" smtClean="0"/>
+              <a:rPr lang="en-US"/>
               <a:t>Click to edit Master title style</a:t>
             </a:r>
-            <a:endParaRPr lang="en-US"/>
           </a:p>
         </p:txBody>
       </p:sp>
@@ -417,38 +430,37 @@
           <a:p>
             <a:pPr lvl="0"/>
             <a:r>
-              <a:rPr lang="en-US" smtClean="0"/>
+              <a:rPr lang="en-US"/>
               <a:t>Click to edit Master text styles</a:t>
             </a:r>
           </a:p>
           <a:p>
             <a:pPr lvl="1"/>
             <a:r>
-              <a:rPr lang="en-US" smtClean="0"/>
+              <a:rPr lang="en-US"/>
               <a:t>Second level</a:t>
             </a:r>
           </a:p>
           <a:p>
             <a:pPr lvl="2"/>
             <a:r>
-              <a:rPr lang="en-US" smtClean="0"/>
+              <a:rPr lang="en-US"/>
               <a:t>Third level</a:t>
             </a:r>
           </a:p>
           <a:p>
             <a:pPr lvl="3"/>
             <a:r>
-              <a:rPr lang="en-US" smtClean="0"/>
+              <a:rPr lang="en-US"/>
               <a:t>Fourth level</a:t>
             </a:r>
           </a:p>
           <a:p>
             <a:pPr lvl="4"/>
             <a:r>
-              <a:rPr lang="en-US" smtClean="0"/>
+              <a:rPr lang="en-US"/>
               <a:t>Fifth level</a:t>
             </a:r>
-            <a:endParaRPr lang="en-US"/>
           </a:p>
         </p:txBody>
       </p:sp>
@@ -470,7 +482,7 @@
             <a:fld id="{1D8BD707-D9CF-40AE-B4C6-C98DA3205C09}" type="datetimeFigureOut">
               <a:rPr lang="en-US" smtClean="0"/>
               <a:pPr/>
-              <a:t>8/1/2011</a:t>
+              <a:t>5/25/2025</a:t>
             </a:fld>
             <a:endParaRPr lang="en-US"/>
           </a:p>
@@ -513,7 +525,7 @@
             <a:fld id="{B6F15528-21DE-4FAA-801E-634DDDAF4B2B}" type="slidenum">
               <a:rPr lang="en-US" smtClean="0"/>
               <a:pPr/>
-              <a:t>‹#›</a:t>
+              <a:t>‹Nº›</a:t>
             </a:fld>
             <a:endParaRPr lang="en-US"/>
           </a:p>
@@ -565,10 +577,9 @@
           <a:lstStyle/>
           <a:p>
             <a:r>
-              <a:rPr lang="en-US" smtClean="0"/>
+              <a:rPr lang="en-US"/>
               <a:t>Click to edit Master title style</a:t>
             </a:r>
-            <a:endParaRPr lang="en-US"/>
           </a:p>
         </p:txBody>
       </p:sp>
@@ -594,38 +605,37 @@
           <a:p>
             <a:pPr lvl="0"/>
             <a:r>
-              <a:rPr lang="en-US" smtClean="0"/>
+              <a:rPr lang="en-US"/>
               <a:t>Click to edit Master text styles</a:t>
             </a:r>
           </a:p>
           <a:p>
             <a:pPr lvl="1"/>
             <a:r>
-              <a:rPr lang="en-US" smtClean="0"/>
+              <a:rPr lang="en-US"/>
               <a:t>Second level</a:t>
             </a:r>
           </a:p>
           <a:p>
             <a:pPr lvl="2"/>
             <a:r>
-              <a:rPr lang="en-US" smtClean="0"/>
+              <a:rPr lang="en-US"/>
               <a:t>Third level</a:t>
             </a:r>
           </a:p>
           <a:p>
             <a:pPr lvl="3"/>
             <a:r>
-              <a:rPr lang="en-US" smtClean="0"/>
+              <a:rPr lang="en-US"/>
               <a:t>Fourth level</a:t>
             </a:r>
           </a:p>
           <a:p>
             <a:pPr lvl="4"/>
             <a:r>
-              <a:rPr lang="en-US" smtClean="0"/>
+              <a:rPr lang="en-US"/>
               <a:t>Fifth level</a:t>
             </a:r>
-            <a:endParaRPr lang="en-US"/>
           </a:p>
         </p:txBody>
       </p:sp>
@@ -647,7 +657,7 @@
             <a:fld id="{1D8BD707-D9CF-40AE-B4C6-C98DA3205C09}" type="datetimeFigureOut">
               <a:rPr lang="en-US" smtClean="0"/>
               <a:pPr/>
-              <a:t>8/1/2011</a:t>
+              <a:t>5/25/2025</a:t>
             </a:fld>
             <a:endParaRPr lang="en-US"/>
           </a:p>
@@ -690,7 +700,7 @@
             <a:fld id="{B6F15528-21DE-4FAA-801E-634DDDAF4B2B}" type="slidenum">
               <a:rPr lang="en-US" smtClean="0"/>
               <a:pPr/>
-              <a:t>‹#›</a:t>
+              <a:t>‹Nº›</a:t>
             </a:fld>
             <a:endParaRPr lang="en-US"/>
           </a:p>
@@ -737,10 +747,9 @@
           <a:lstStyle/>
           <a:p>
             <a:r>
-              <a:rPr lang="en-US" smtClean="0"/>
+              <a:rPr lang="en-US"/>
               <a:t>Click to edit Master title style</a:t>
             </a:r>
-            <a:endParaRPr lang="en-US"/>
           </a:p>
         </p:txBody>
       </p:sp>
@@ -761,38 +770,37 @@
           <a:p>
             <a:pPr lvl="0"/>
             <a:r>
-              <a:rPr lang="en-US" smtClean="0"/>
+              <a:rPr lang="en-US"/>
               <a:t>Click to edit Master text styles</a:t>
             </a:r>
           </a:p>
           <a:p>
             <a:pPr lvl="1"/>
             <a:r>
-              <a:rPr lang="en-US" smtClean="0"/>
+              <a:rPr lang="en-US"/>
               <a:t>Second level</a:t>
             </a:r>
           </a:p>
           <a:p>
             <a:pPr lvl="2"/>
             <a:r>
-              <a:rPr lang="en-US" smtClean="0"/>
+              <a:rPr lang="en-US"/>
               <a:t>Third level</a:t>
             </a:r>
           </a:p>
           <a:p>
             <a:pPr lvl="3"/>
             <a:r>
-              <a:rPr lang="en-US" smtClean="0"/>
+              <a:rPr lang="en-US"/>
               <a:t>Fourth level</a:t>
             </a:r>
           </a:p>
           <a:p>
             <a:pPr lvl="4"/>
             <a:r>
-              <a:rPr lang="en-US" smtClean="0"/>
+              <a:rPr lang="en-US"/>
               <a:t>Fifth level</a:t>
             </a:r>
-            <a:endParaRPr lang="en-US"/>
           </a:p>
         </p:txBody>
       </p:sp>
@@ -814,7 +822,7 @@
             <a:fld id="{1D8BD707-D9CF-40AE-B4C6-C98DA3205C09}" type="datetimeFigureOut">
               <a:rPr lang="en-US" smtClean="0"/>
               <a:pPr/>
-              <a:t>8/1/2011</a:t>
+              <a:t>5/25/2025</a:t>
             </a:fld>
             <a:endParaRPr lang="en-US"/>
           </a:p>
@@ -857,7 +865,7 @@
             <a:fld id="{B6F15528-21DE-4FAA-801E-634DDDAF4B2B}" type="slidenum">
               <a:rPr lang="en-US" smtClean="0"/>
               <a:pPr/>
-              <a:t>‹#›</a:t>
+              <a:t>‹Nº›</a:t>
             </a:fld>
             <a:endParaRPr lang="en-US"/>
           </a:p>
@@ -913,10 +921,9 @@
           </a:lstStyle>
           <a:p>
             <a:r>
-              <a:rPr lang="en-US" smtClean="0"/>
+              <a:rPr lang="en-US"/>
               <a:t>Click to edit Master title style</a:t>
             </a:r>
-            <a:endParaRPr lang="en-US"/>
           </a:p>
         </p:txBody>
       </p:sp>
@@ -1033,7 +1040,7 @@
           <a:p>
             <a:pPr lvl="0"/>
             <a:r>
-              <a:rPr lang="en-US" smtClean="0"/>
+              <a:rPr lang="en-US"/>
               <a:t>Click to edit Master text styles</a:t>
             </a:r>
           </a:p>
@@ -1057,7 +1064,7 @@
             <a:fld id="{1D8BD707-D9CF-40AE-B4C6-C98DA3205C09}" type="datetimeFigureOut">
               <a:rPr lang="en-US" smtClean="0"/>
               <a:pPr/>
-              <a:t>8/1/2011</a:t>
+              <a:t>5/25/2025</a:t>
             </a:fld>
             <a:endParaRPr lang="en-US"/>
           </a:p>
@@ -1100,7 +1107,7 @@
             <a:fld id="{B6F15528-21DE-4FAA-801E-634DDDAF4B2B}" type="slidenum">
               <a:rPr lang="en-US" smtClean="0"/>
               <a:pPr/>
-              <a:t>‹#›</a:t>
+              <a:t>‹Nº›</a:t>
             </a:fld>
             <a:endParaRPr lang="en-US"/>
           </a:p>
@@ -1147,10 +1154,9 @@
           <a:lstStyle/>
           <a:p>
             <a:r>
-              <a:rPr lang="en-US" smtClean="0"/>
+              <a:rPr lang="en-US"/>
               <a:t>Click to edit Master title style</a:t>
             </a:r>
-            <a:endParaRPr lang="en-US"/>
           </a:p>
         </p:txBody>
       </p:sp>
@@ -1204,38 +1210,37 @@
           <a:p>
             <a:pPr lvl="0"/>
             <a:r>
-              <a:rPr lang="en-US" smtClean="0"/>
+              <a:rPr lang="en-US"/>
               <a:t>Click to edit Master text styles</a:t>
             </a:r>
           </a:p>
           <a:p>
             <a:pPr lvl="1"/>
             <a:r>
-              <a:rPr lang="en-US" smtClean="0"/>
+              <a:rPr lang="en-US"/>
               <a:t>Second level</a:t>
             </a:r>
           </a:p>
           <a:p>
             <a:pPr lvl="2"/>
             <a:r>
-              <a:rPr lang="en-US" smtClean="0"/>
+              <a:rPr lang="en-US"/>
               <a:t>Third level</a:t>
             </a:r>
           </a:p>
           <a:p>
             <a:pPr lvl="3"/>
             <a:r>
-              <a:rPr lang="en-US" smtClean="0"/>
+              <a:rPr lang="en-US"/>
               <a:t>Fourth level</a:t>
             </a:r>
           </a:p>
           <a:p>
             <a:pPr lvl="4"/>
             <a:r>
-              <a:rPr lang="en-US" smtClean="0"/>
+              <a:rPr lang="en-US"/>
               <a:t>Fifth level</a:t>
             </a:r>
-            <a:endParaRPr lang="en-US"/>
           </a:p>
         </p:txBody>
       </p:sp>
@@ -1289,38 +1294,37 @@
           <a:p>
             <a:pPr lvl="0"/>
             <a:r>
-              <a:rPr lang="en-US" smtClean="0"/>
+              <a:rPr lang="en-US"/>
               <a:t>Click to edit Master text styles</a:t>
             </a:r>
           </a:p>
           <a:p>
             <a:pPr lvl="1"/>
             <a:r>
-              <a:rPr lang="en-US" smtClean="0"/>
+              <a:rPr lang="en-US"/>
               <a:t>Second level</a:t>
             </a:r>
           </a:p>
           <a:p>
             <a:pPr lvl="2"/>
             <a:r>
-              <a:rPr lang="en-US" smtClean="0"/>
+              <a:rPr lang="en-US"/>
               <a:t>Third level</a:t>
             </a:r>
           </a:p>
           <a:p>
             <a:pPr lvl="3"/>
             <a:r>
-              <a:rPr lang="en-US" smtClean="0"/>
+              <a:rPr lang="en-US"/>
               <a:t>Fourth level</a:t>
             </a:r>
           </a:p>
           <a:p>
             <a:pPr lvl="4"/>
             <a:r>
-              <a:rPr lang="en-US" smtClean="0"/>
+              <a:rPr lang="en-US"/>
               <a:t>Fifth level</a:t>
             </a:r>
-            <a:endParaRPr lang="en-US"/>
           </a:p>
         </p:txBody>
       </p:sp>
@@ -1342,7 +1346,7 @@
             <a:fld id="{1D8BD707-D9CF-40AE-B4C6-C98DA3205C09}" type="datetimeFigureOut">
               <a:rPr lang="en-US" smtClean="0"/>
               <a:pPr/>
-              <a:t>8/1/2011</a:t>
+              <a:t>5/25/2025</a:t>
             </a:fld>
             <a:endParaRPr lang="en-US"/>
           </a:p>
@@ -1385,7 +1389,7 @@
             <a:fld id="{B6F15528-21DE-4FAA-801E-634DDDAF4B2B}" type="slidenum">
               <a:rPr lang="en-US" smtClean="0"/>
               <a:pPr/>
-              <a:t>‹#›</a:t>
+              <a:t>‹Nº›</a:t>
             </a:fld>
             <a:endParaRPr lang="en-US"/>
           </a:p>
@@ -1436,10 +1440,9 @@
           </a:lstStyle>
           <a:p>
             <a:r>
-              <a:rPr lang="en-US" smtClean="0"/>
+              <a:rPr lang="en-US"/>
               <a:t>Click to edit Master title style</a:t>
             </a:r>
-            <a:endParaRPr lang="en-US"/>
           </a:p>
         </p:txBody>
       </p:sp>
@@ -1502,7 +1505,7 @@
           <a:p>
             <a:pPr lvl="0"/>
             <a:r>
-              <a:rPr lang="en-US" smtClean="0"/>
+              <a:rPr lang="en-US"/>
               <a:t>Click to edit Master text styles</a:t>
             </a:r>
           </a:p>
@@ -1558,38 +1561,37 @@
           <a:p>
             <a:pPr lvl="0"/>
             <a:r>
-              <a:rPr lang="en-US" smtClean="0"/>
+              <a:rPr lang="en-US"/>
               <a:t>Click to edit Master text styles</a:t>
             </a:r>
           </a:p>
           <a:p>
             <a:pPr lvl="1"/>
             <a:r>
-              <a:rPr lang="en-US" smtClean="0"/>
+              <a:rPr lang="en-US"/>
               <a:t>Second level</a:t>
             </a:r>
           </a:p>
           <a:p>
             <a:pPr lvl="2"/>
             <a:r>
-              <a:rPr lang="en-US" smtClean="0"/>
+              <a:rPr lang="en-US"/>
               <a:t>Third level</a:t>
             </a:r>
           </a:p>
           <a:p>
             <a:pPr lvl="3"/>
             <a:r>
-              <a:rPr lang="en-US" smtClean="0"/>
+              <a:rPr lang="en-US"/>
               <a:t>Fourth level</a:t>
             </a:r>
           </a:p>
           <a:p>
             <a:pPr lvl="4"/>
             <a:r>
-              <a:rPr lang="en-US" smtClean="0"/>
+              <a:rPr lang="en-US"/>
               <a:t>Fifth level</a:t>
             </a:r>
-            <a:endParaRPr lang="en-US"/>
           </a:p>
         </p:txBody>
       </p:sp>
@@ -1652,7 +1654,7 @@
           <a:p>
             <a:pPr lvl="0"/>
             <a:r>
-              <a:rPr lang="en-US" smtClean="0"/>
+              <a:rPr lang="en-US"/>
               <a:t>Click to edit Master text styles</a:t>
             </a:r>
           </a:p>
@@ -1708,38 +1710,37 @@
           <a:p>
             <a:pPr lvl="0"/>
             <a:r>
-              <a:rPr lang="en-US" smtClean="0"/>
+              <a:rPr lang="en-US"/>
               <a:t>Click to edit Master text styles</a:t>
             </a:r>
           </a:p>
           <a:p>
             <a:pPr lvl="1"/>
             <a:r>
-              <a:rPr lang="en-US" smtClean="0"/>
+              <a:rPr lang="en-US"/>
               <a:t>Second level</a:t>
             </a:r>
           </a:p>
           <a:p>
             <a:pPr lvl="2"/>
             <a:r>
-              <a:rPr lang="en-US" smtClean="0"/>
+              <a:rPr lang="en-US"/>
               <a:t>Third level</a:t>
             </a:r>
           </a:p>
           <a:p>
             <a:pPr lvl="3"/>
             <a:r>
-              <a:rPr lang="en-US" smtClean="0"/>
+              <a:rPr lang="en-US"/>
               <a:t>Fourth level</a:t>
             </a:r>
           </a:p>
           <a:p>
             <a:pPr lvl="4"/>
             <a:r>
-              <a:rPr lang="en-US" smtClean="0"/>
+              <a:rPr lang="en-US"/>
               <a:t>Fifth level</a:t>
             </a:r>
-            <a:endParaRPr lang="en-US"/>
           </a:p>
         </p:txBody>
       </p:sp>
@@ -1761,7 +1762,7 @@
             <a:fld id="{1D8BD707-D9CF-40AE-B4C6-C98DA3205C09}" type="datetimeFigureOut">
               <a:rPr lang="en-US" smtClean="0"/>
               <a:pPr/>
-              <a:t>8/1/2011</a:t>
+              <a:t>5/25/2025</a:t>
             </a:fld>
             <a:endParaRPr lang="en-US"/>
           </a:p>
@@ -1804,7 +1805,7 @@
             <a:fld id="{B6F15528-21DE-4FAA-801E-634DDDAF4B2B}" type="slidenum">
               <a:rPr lang="en-US" smtClean="0"/>
               <a:pPr/>
-              <a:t>‹#›</a:t>
+              <a:t>‹Nº›</a:t>
             </a:fld>
             <a:endParaRPr lang="en-US"/>
           </a:p>
@@ -1851,10 +1852,9 @@
           <a:lstStyle/>
           <a:p>
             <a:r>
-              <a:rPr lang="en-US" smtClean="0"/>
+              <a:rPr lang="en-US"/>
               <a:t>Click to edit Master title style</a:t>
             </a:r>
-            <a:endParaRPr lang="en-US"/>
           </a:p>
         </p:txBody>
       </p:sp>
@@ -1876,7 +1876,7 @@
             <a:fld id="{1D8BD707-D9CF-40AE-B4C6-C98DA3205C09}" type="datetimeFigureOut">
               <a:rPr lang="en-US" smtClean="0"/>
               <a:pPr/>
-              <a:t>8/1/2011</a:t>
+              <a:t>5/25/2025</a:t>
             </a:fld>
             <a:endParaRPr lang="en-US"/>
           </a:p>
@@ -1919,7 +1919,7 @@
             <a:fld id="{B6F15528-21DE-4FAA-801E-634DDDAF4B2B}" type="slidenum">
               <a:rPr lang="en-US" smtClean="0"/>
               <a:pPr/>
-              <a:t>‹#›</a:t>
+              <a:t>‹Nº›</a:t>
             </a:fld>
             <a:endParaRPr lang="en-US"/>
           </a:p>
@@ -1968,7 +1968,7 @@
             <a:fld id="{1D8BD707-D9CF-40AE-B4C6-C98DA3205C09}" type="datetimeFigureOut">
               <a:rPr lang="en-US" smtClean="0"/>
               <a:pPr/>
-              <a:t>8/1/2011</a:t>
+              <a:t>5/25/2025</a:t>
             </a:fld>
             <a:endParaRPr lang="en-US"/>
           </a:p>
@@ -2011,7 +2011,7 @@
             <a:fld id="{B6F15528-21DE-4FAA-801E-634DDDAF4B2B}" type="slidenum">
               <a:rPr lang="en-US" smtClean="0"/>
               <a:pPr/>
-              <a:t>‹#›</a:t>
+              <a:t>‹Nº›</a:t>
             </a:fld>
             <a:endParaRPr lang="en-US"/>
           </a:p>
@@ -2067,10 +2067,9 @@
           </a:lstStyle>
           <a:p>
             <a:r>
-              <a:rPr lang="en-US" smtClean="0"/>
+              <a:rPr lang="en-US"/>
               <a:t>Click to edit Master title style</a:t>
             </a:r>
-            <a:endParaRPr lang="en-US"/>
           </a:p>
         </p:txBody>
       </p:sp>
@@ -2124,38 +2123,37 @@
           <a:p>
             <a:pPr lvl="0"/>
             <a:r>
-              <a:rPr lang="en-US" smtClean="0"/>
+              <a:rPr lang="en-US"/>
               <a:t>Click to edit Master text styles</a:t>
             </a:r>
           </a:p>
           <a:p>
             <a:pPr lvl="1"/>
             <a:r>
-              <a:rPr lang="en-US" smtClean="0"/>
+              <a:rPr lang="en-US"/>
               <a:t>Second level</a:t>
             </a:r>
           </a:p>
           <a:p>
             <a:pPr lvl="2"/>
             <a:r>
-              <a:rPr lang="en-US" smtClean="0"/>
+              <a:rPr lang="en-US"/>
               <a:t>Third level</a:t>
             </a:r>
           </a:p>
           <a:p>
             <a:pPr lvl="3"/>
             <a:r>
-              <a:rPr lang="en-US" smtClean="0"/>
+              <a:rPr lang="en-US"/>
               <a:t>Fourth level</a:t>
             </a:r>
           </a:p>
           <a:p>
             <a:pPr lvl="4"/>
             <a:r>
-              <a:rPr lang="en-US" smtClean="0"/>
+              <a:rPr lang="en-US"/>
               <a:t>Fifth level</a:t>
             </a:r>
-            <a:endParaRPr lang="en-US"/>
           </a:p>
         </p:txBody>
       </p:sp>
@@ -2218,7 +2216,7 @@
           <a:p>
             <a:pPr lvl="0"/>
             <a:r>
-              <a:rPr lang="en-US" smtClean="0"/>
+              <a:rPr lang="en-US"/>
               <a:t>Click to edit Master text styles</a:t>
             </a:r>
           </a:p>
@@ -2242,7 +2240,7 @@
             <a:fld id="{1D8BD707-D9CF-40AE-B4C6-C98DA3205C09}" type="datetimeFigureOut">
               <a:rPr lang="en-US" smtClean="0"/>
               <a:pPr/>
-              <a:t>8/1/2011</a:t>
+              <a:t>5/25/2025</a:t>
             </a:fld>
             <a:endParaRPr lang="en-US"/>
           </a:p>
@@ -2285,7 +2283,7 @@
             <a:fld id="{B6F15528-21DE-4FAA-801E-634DDDAF4B2B}" type="slidenum">
               <a:rPr lang="en-US" smtClean="0"/>
               <a:pPr/>
-              <a:t>‹#›</a:t>
+              <a:t>‹Nº›</a:t>
             </a:fld>
             <a:endParaRPr lang="en-US"/>
           </a:p>
@@ -2341,10 +2339,9 @@
           </a:lstStyle>
           <a:p>
             <a:r>
-              <a:rPr lang="en-US" smtClean="0"/>
+              <a:rPr lang="en-US"/>
               <a:t>Click to edit Master title style</a:t>
             </a:r>
-            <a:endParaRPr lang="en-US"/>
           </a:p>
         </p:txBody>
       </p:sp>
@@ -2468,7 +2465,7 @@
           <a:p>
             <a:pPr lvl="0"/>
             <a:r>
-              <a:rPr lang="en-US" smtClean="0"/>
+              <a:rPr lang="en-US"/>
               <a:t>Click to edit Master text styles</a:t>
             </a:r>
           </a:p>
@@ -2492,7 +2489,7 @@
             <a:fld id="{1D8BD707-D9CF-40AE-B4C6-C98DA3205C09}" type="datetimeFigureOut">
               <a:rPr lang="en-US" smtClean="0"/>
               <a:pPr/>
-              <a:t>8/1/2011</a:t>
+              <a:t>5/25/2025</a:t>
             </a:fld>
             <a:endParaRPr lang="en-US"/>
           </a:p>
@@ -2535,7 +2532,7 @@
             <a:fld id="{B6F15528-21DE-4FAA-801E-634DDDAF4B2B}" type="slidenum">
               <a:rPr lang="en-US" smtClean="0"/>
               <a:pPr/>
-              <a:t>‹#›</a:t>
+              <a:t>‹Nº›</a:t>
             </a:fld>
             <a:endParaRPr lang="en-US"/>
           </a:p>
@@ -2597,10 +2594,9 @@
           <a:lstStyle/>
           <a:p>
             <a:r>
-              <a:rPr lang="en-US" smtClean="0"/>
+              <a:rPr lang="en-US"/>
               <a:t>Click to edit Master title style</a:t>
             </a:r>
-            <a:endParaRPr lang="en-US"/>
           </a:p>
         </p:txBody>
       </p:sp>
@@ -2631,38 +2627,37 @@
           <a:p>
             <a:pPr lvl="0"/>
             <a:r>
-              <a:rPr lang="en-US" smtClean="0"/>
+              <a:rPr lang="en-US"/>
               <a:t>Click to edit Master text styles</a:t>
             </a:r>
           </a:p>
           <a:p>
             <a:pPr lvl="1"/>
             <a:r>
-              <a:rPr lang="en-US" smtClean="0"/>
+              <a:rPr lang="en-US"/>
               <a:t>Second level</a:t>
             </a:r>
           </a:p>
           <a:p>
             <a:pPr lvl="2"/>
             <a:r>
-              <a:rPr lang="en-US" smtClean="0"/>
+              <a:rPr lang="en-US"/>
               <a:t>Third level</a:t>
             </a:r>
           </a:p>
           <a:p>
             <a:pPr lvl="3"/>
             <a:r>
-              <a:rPr lang="en-US" smtClean="0"/>
+              <a:rPr lang="en-US"/>
               <a:t>Fourth level</a:t>
             </a:r>
           </a:p>
           <a:p>
             <a:pPr lvl="4"/>
             <a:r>
-              <a:rPr lang="en-US" smtClean="0"/>
+              <a:rPr lang="en-US"/>
               <a:t>Fifth level</a:t>
             </a:r>
-            <a:endParaRPr lang="en-US"/>
           </a:p>
         </p:txBody>
       </p:sp>
@@ -2702,7 +2697,7 @@
             <a:fld id="{1D8BD707-D9CF-40AE-B4C6-C98DA3205C09}" type="datetimeFigureOut">
               <a:rPr lang="en-US" smtClean="0"/>
               <a:pPr/>
-              <a:t>8/1/2011</a:t>
+              <a:t>5/25/2025</a:t>
             </a:fld>
             <a:endParaRPr lang="en-US"/>
           </a:p>
@@ -2781,7 +2776,7 @@
             <a:fld id="{B6F15528-21DE-4FAA-801E-634DDDAF4B2B}" type="slidenum">
               <a:rPr lang="en-US" smtClean="0"/>
               <a:pPr/>
-              <a:t>‹#›</a:t>
+              <a:t>‹Nº›</a:t>
             </a:fld>
             <a:endParaRPr lang="en-US"/>
           </a:p>
@@ -3057,7 +3052,7 @@
 </file>
 
 <file path=ppt/slides/slide1.xml><?xml version="1.0" encoding="utf-8"?>
-<p:sld xmlns:p="http://schemas.openxmlformats.org/presentationml/2006/main" xmlns:a="http://schemas.openxmlformats.org/drawingml/2006/main" xmlns:r="http://schemas.openxmlformats.org/officeDocument/2006/relationships">
+<p:sld xmlns:a="http://schemas.openxmlformats.org/drawingml/2006/main" xmlns:r="http://schemas.openxmlformats.org/officeDocument/2006/relationships" xmlns:p="http://schemas.openxmlformats.org/presentationml/2006/main">
   <p:cSld>
     <p:spTree>
       <p:nvGrpSpPr>
@@ -3075,13 +3070,13 @@
       </p:grpSpPr>
       <p:sp>
         <p:nvSpPr>
-          <p:cNvPr name="TextBox 2" id="2"/>
-          <p:cNvSpPr txBox="true"/>
+          <p:cNvPr id="2" name="TextBox 2"/>
+          <p:cNvSpPr txBox="1"/>
           <p:nvPr/>
         </p:nvSpPr>
         <p:spPr>
-          <a:xfrm rot="0">
-            <a:off x="1103614" y="1984101"/>
+          <a:xfrm>
+            <a:off x="1103612" y="2009055"/>
             <a:ext cx="8484773" cy="613411"/>
           </a:xfrm>
           <a:prstGeom prst="rect">
@@ -3089,7 +3084,7 @@
           </a:prstGeom>
         </p:spPr>
         <p:txBody>
-          <a:bodyPr anchor="t" rtlCol="false" tIns="0" lIns="0" bIns="0" rIns="0">
+          <a:bodyPr lIns="0" tIns="0" rIns="0" bIns="0" rtlCol="0" anchor="t">
             <a:spAutoFit/>
           </a:bodyPr>
           <a:lstStyle/>
@@ -3103,7 +3098,7 @@
               </a:spcBef>
             </a:pPr>
             <a:r>
-              <a:rPr lang="en-US" sz="3599">
+              <a:rPr lang="en-US" sz="3599" dirty="0">
                 <a:solidFill>
                   <a:srgbClr val="000000"/>
                 </a:solidFill>
@@ -3112,14 +3107,38 @@
                 <a:cs typeface="Tex Gyre Termes"/>
                 <a:sym typeface="Tex Gyre Termes"/>
               </a:rPr>
-              <a:t>Constancia de participación a:</a:t>
-            </a:r>
-          </a:p>
-        </p:txBody>
-      </p:sp>
-      <p:sp>
-        <p:nvSpPr>
-          <p:cNvPr name="AutoShape 3" id="3"/>
+              <a:t>Constancia de </a:t>
+            </a:r>
+            <a:r>
+              <a:rPr lang="en-US" sz="3599" dirty="0" err="1">
+                <a:solidFill>
+                  <a:srgbClr val="000000"/>
+                </a:solidFill>
+                <a:latin typeface="Tex Gyre Termes"/>
+                <a:ea typeface="Tex Gyre Termes"/>
+                <a:cs typeface="Tex Gyre Termes"/>
+                <a:sym typeface="Tex Gyre Termes"/>
+              </a:rPr>
+              <a:t>participación</a:t>
+            </a:r>
+            <a:r>
+              <a:rPr lang="en-US" sz="3599" dirty="0">
+                <a:solidFill>
+                  <a:srgbClr val="000000"/>
+                </a:solidFill>
+                <a:latin typeface="Tex Gyre Termes"/>
+                <a:ea typeface="Tex Gyre Termes"/>
+                <a:cs typeface="Tex Gyre Termes"/>
+                <a:sym typeface="Tex Gyre Termes"/>
+              </a:rPr>
+              <a:t> a:</a:t>
+            </a:r>
+          </a:p>
+        </p:txBody>
+      </p:sp>
+      <p:sp>
+        <p:nvSpPr>
+          <p:cNvPr id="3" name="AutoShape 3"/>
           <p:cNvSpPr/>
           <p:nvPr/>
         </p:nvSpPr>
@@ -3131,24 +3150,31 @@
           <a:prstGeom prst="line">
             <a:avLst/>
           </a:prstGeom>
-          <a:ln cap="rnd" w="19050">
+          <a:ln w="19050" cap="rnd">
             <a:solidFill>
               <a:srgbClr val="000000"/>
             </a:solidFill>
             <a:prstDash val="solid"/>
-            <a:headEnd type="none" len="sm" w="sm"/>
-            <a:tailEnd type="none" len="sm" w="sm"/>
+            <a:headEnd type="none" w="sm" len="sm"/>
+            <a:tailEnd type="none" w="sm" len="sm"/>
           </a:ln>
         </p:spPr>
-      </p:sp>
-      <p:sp>
-        <p:nvSpPr>
-          <p:cNvPr name="Freeform 4" id="4"/>
+        <p:txBody>
+          <a:bodyPr/>
+          <a:lstStyle/>
+          <a:p>
+            <a:endParaRPr lang="es-HN"/>
+          </a:p>
+        </p:txBody>
+      </p:sp>
+      <p:sp>
+        <p:nvSpPr>
+          <p:cNvPr id="4" name="Freeform 4"/>
           <p:cNvSpPr/>
           <p:nvPr/>
         </p:nvSpPr>
         <p:spPr>
-          <a:xfrm flipH="false" flipV="false" rot="0">
+          <a:xfrm>
             <a:off x="0" y="0"/>
             <a:ext cx="1593932" cy="1593932"/>
           </a:xfrm>
@@ -3157,9 +3183,9 @@
             <a:gdLst/>
             <a:ahLst/>
             <a:cxnLst/>
-            <a:rect r="r" b="b" t="t" l="l"/>
+            <a:rect l="l" t="t" r="r" b="b"/>
             <a:pathLst>
-              <a:path h="1593932" w="1593932">
+              <a:path w="1593932" h="1593932">
                 <a:moveTo>
                   <a:pt x="0" y="0"/>
                 </a:moveTo>
@@ -3188,20 +3214,27 @@
               </a:extLst>
             </a:blip>
             <a:stretch>
-              <a:fillRect l="0" t="0" r="0" b="0"/>
+              <a:fillRect/>
             </a:stretch>
           </a:blipFill>
         </p:spPr>
-      </p:sp>
-      <p:sp>
-        <p:nvSpPr>
-          <p:cNvPr name="TextBox 5" id="5"/>
-          <p:cNvSpPr txBox="true"/>
+        <p:txBody>
+          <a:bodyPr/>
+          <a:lstStyle/>
+          <a:p>
+            <a:endParaRPr lang="es-HN"/>
+          </a:p>
+        </p:txBody>
+      </p:sp>
+      <p:sp>
+        <p:nvSpPr>
+          <p:cNvPr id="5" name="TextBox 5"/>
+          <p:cNvSpPr txBox="1"/>
           <p:nvPr/>
         </p:nvSpPr>
         <p:spPr>
-          <a:xfrm rot="0">
-            <a:off x="522757" y="1246866"/>
+          <a:xfrm>
+            <a:off x="522757" y="1268786"/>
             <a:ext cx="9646486" cy="727710"/>
           </a:xfrm>
           <a:prstGeom prst="rect">
@@ -3209,7 +3242,7 @@
           </a:prstGeom>
         </p:spPr>
         <p:txBody>
-          <a:bodyPr anchor="t" rtlCol="false" tIns="0" lIns="0" bIns="0" rIns="0">
+          <a:bodyPr lIns="0" tIns="0" rIns="0" bIns="0" rtlCol="0" anchor="t">
             <a:spAutoFit/>
           </a:bodyPr>
           <a:lstStyle/>
@@ -3223,7 +3256,7 @@
               </a:spcBef>
             </a:pPr>
             <a:r>
-              <a:rPr lang="en-US" sz="2100">
+              <a:rPr lang="en-US" sz="2100" dirty="0">
                 <a:solidFill>
                   <a:srgbClr val="000000"/>
                 </a:solidFill>
@@ -3245,7 +3278,7 @@
               </a:spcBef>
             </a:pPr>
             <a:r>
-              <a:rPr lang="en-US" sz="2100">
+              <a:rPr lang="en-US" sz="2100" dirty="0" err="1">
                 <a:solidFill>
                   <a:srgbClr val="000000"/>
                 </a:solidFill>
@@ -3254,19 +3287,52 @@
                 <a:cs typeface="Tex Gyre Termes"/>
                 <a:sym typeface="Tex Gyre Termes"/>
               </a:rPr>
-              <a:t>Otorga la presente</a:t>
-            </a:r>
-          </a:p>
-        </p:txBody>
-      </p:sp>
-      <p:sp>
-        <p:nvSpPr>
-          <p:cNvPr name="Freeform 6" id="6"/>
+              <a:t>Otorga</a:t>
+            </a:r>
+            <a:r>
+              <a:rPr lang="en-US" sz="2100" dirty="0">
+                <a:solidFill>
+                  <a:srgbClr val="000000"/>
+                </a:solidFill>
+                <a:latin typeface="Tex Gyre Termes"/>
+                <a:ea typeface="Tex Gyre Termes"/>
+                <a:cs typeface="Tex Gyre Termes"/>
+                <a:sym typeface="Tex Gyre Termes"/>
+              </a:rPr>
+              <a:t> la </a:t>
+            </a:r>
+            <a:r>
+              <a:rPr lang="en-US" sz="2100" dirty="0" err="1">
+                <a:solidFill>
+                  <a:srgbClr val="000000"/>
+                </a:solidFill>
+                <a:latin typeface="Tex Gyre Termes"/>
+                <a:ea typeface="Tex Gyre Termes"/>
+                <a:cs typeface="Tex Gyre Termes"/>
+                <a:sym typeface="Tex Gyre Termes"/>
+              </a:rPr>
+              <a:t>presente</a:t>
+            </a:r>
+            <a:endParaRPr lang="en-US" sz="2100" dirty="0">
+              <a:solidFill>
+                <a:srgbClr val="000000"/>
+              </a:solidFill>
+              <a:latin typeface="Tex Gyre Termes"/>
+              <a:ea typeface="Tex Gyre Termes"/>
+              <a:cs typeface="Tex Gyre Termes"/>
+              <a:sym typeface="Tex Gyre Termes"/>
+            </a:endParaRPr>
+          </a:p>
+        </p:txBody>
+      </p:sp>
+      <p:sp>
+        <p:nvSpPr>
+          <p:cNvPr id="6" name="Freeform 6"/>
           <p:cNvSpPr/>
           <p:nvPr/>
         </p:nvSpPr>
         <p:spPr>
-          <a:xfrm flipH="false" flipV="false" rot="5400000">
+          <a:xfrm rot="5400000">
             <a:off x="9098068" y="0"/>
             <a:ext cx="1593932" cy="1593932"/>
           </a:xfrm>
@@ -3275,9 +3341,9 @@
             <a:gdLst/>
             <a:ahLst/>
             <a:cxnLst/>
-            <a:rect r="r" b="b" t="t" l="l"/>
+            <a:rect l="l" t="t" r="r" b="b"/>
             <a:pathLst>
-              <a:path h="1593932" w="1593932">
+              <a:path w="1593932" h="1593932">
                 <a:moveTo>
                   <a:pt x="0" y="0"/>
                 </a:moveTo>
@@ -3306,19 +3372,26 @@
               </a:extLst>
             </a:blip>
             <a:stretch>
-              <a:fillRect l="0" t="0" r="0" b="0"/>
+              <a:fillRect/>
             </a:stretch>
           </a:blipFill>
         </p:spPr>
-      </p:sp>
-      <p:sp>
-        <p:nvSpPr>
-          <p:cNvPr name="Freeform 7" id="7"/>
+        <p:txBody>
+          <a:bodyPr/>
+          <a:lstStyle/>
+          <a:p>
+            <a:endParaRPr lang="es-HN"/>
+          </a:p>
+        </p:txBody>
+      </p:sp>
+      <p:sp>
+        <p:nvSpPr>
+          <p:cNvPr id="7" name="Freeform 7"/>
           <p:cNvSpPr/>
           <p:nvPr/>
         </p:nvSpPr>
         <p:spPr>
-          <a:xfrm flipH="false" flipV="false" rot="-10800000">
+          <a:xfrm rot="-10800000">
             <a:off x="9098068" y="5955496"/>
             <a:ext cx="1593932" cy="1593932"/>
           </a:xfrm>
@@ -3327,9 +3400,9 @@
             <a:gdLst/>
             <a:ahLst/>
             <a:cxnLst/>
-            <a:rect r="r" b="b" t="t" l="l"/>
+            <a:rect l="l" t="t" r="r" b="b"/>
             <a:pathLst>
-              <a:path h="1593932" w="1593932">
+              <a:path w="1593932" h="1593932">
                 <a:moveTo>
                   <a:pt x="0" y="0"/>
                 </a:moveTo>
@@ -3358,19 +3431,26 @@
               </a:extLst>
             </a:blip>
             <a:stretch>
-              <a:fillRect l="0" t="0" r="0" b="0"/>
+              <a:fillRect/>
             </a:stretch>
           </a:blipFill>
         </p:spPr>
-      </p:sp>
-      <p:sp>
-        <p:nvSpPr>
-          <p:cNvPr name="Freeform 8" id="8"/>
+        <p:txBody>
+          <a:bodyPr/>
+          <a:lstStyle/>
+          <a:p>
+            <a:endParaRPr lang="es-HN"/>
+          </a:p>
+        </p:txBody>
+      </p:sp>
+      <p:sp>
+        <p:nvSpPr>
+          <p:cNvPr id="8" name="Freeform 8"/>
           <p:cNvSpPr/>
           <p:nvPr/>
         </p:nvSpPr>
         <p:spPr>
-          <a:xfrm flipH="false" flipV="false" rot="-5400000">
+          <a:xfrm rot="-5400000">
             <a:off x="0" y="5955496"/>
             <a:ext cx="1593932" cy="1593932"/>
           </a:xfrm>
@@ -3379,9 +3459,9 @@
             <a:gdLst/>
             <a:ahLst/>
             <a:cxnLst/>
-            <a:rect r="r" b="b" t="t" l="l"/>
+            <a:rect l="l" t="t" r="r" b="b"/>
             <a:pathLst>
-              <a:path h="1593932" w="1593932">
+              <a:path w="1593932" h="1593932">
                 <a:moveTo>
                   <a:pt x="0" y="0"/>
                 </a:moveTo>
@@ -3410,28 +3490,35 @@
               </a:extLst>
             </a:blip>
             <a:stretch>
-              <a:fillRect l="0" t="0" r="0" b="0"/>
+              <a:fillRect/>
             </a:stretch>
           </a:blipFill>
         </p:spPr>
-      </p:sp>
-      <p:sp>
-        <p:nvSpPr>
-          <p:cNvPr name="TextBox 9" id="9"/>
-          <p:cNvSpPr txBox="true"/>
+        <p:txBody>
+          <a:bodyPr/>
+          <a:lstStyle/>
+          <a:p>
+            <a:endParaRPr lang="es-HN"/>
+          </a:p>
+        </p:txBody>
+      </p:sp>
+      <p:sp>
+        <p:nvSpPr>
+          <p:cNvPr id="9" name="TextBox 9"/>
+          <p:cNvSpPr txBox="1"/>
           <p:nvPr/>
         </p:nvSpPr>
         <p:spPr>
-          <a:xfrm rot="0">
-            <a:off x="1012068" y="3440597"/>
-            <a:ext cx="9157175" cy="1470661"/>
+          <a:xfrm>
+            <a:off x="767412" y="3440906"/>
+            <a:ext cx="9157175" cy="1457900"/>
           </a:xfrm>
           <a:prstGeom prst="rect">
             <a:avLst/>
           </a:prstGeom>
         </p:spPr>
         <p:txBody>
-          <a:bodyPr anchor="t" rtlCol="false" tIns="0" lIns="0" bIns="0" rIns="0">
+          <a:bodyPr lIns="0" tIns="0" rIns="0" bIns="0" rtlCol="0" anchor="t">
             <a:spAutoFit/>
           </a:bodyPr>
           <a:lstStyle/>
@@ -3442,7 +3529,7 @@
               </a:lnSpc>
             </a:pPr>
             <a:r>
-              <a:rPr lang="en-US" sz="2099">
+              <a:rPr lang="en-US" sz="1900" dirty="0">
                 <a:solidFill>
                   <a:srgbClr val="000000"/>
                 </a:solidFill>
@@ -3451,7 +3538,127 @@
                 <a:cs typeface="Tex Gyre Termes"/>
                 <a:sym typeface="Tex Gyre Termes"/>
               </a:rPr>
-              <a:t>Por haber participado en el           de </a:t>
+              <a:t>Por </a:t>
+            </a:r>
+            <a:r>
+              <a:rPr lang="en-US" sz="1900" dirty="0" err="1">
+                <a:solidFill>
+                  <a:srgbClr val="000000"/>
+                </a:solidFill>
+                <a:latin typeface="Tex Gyre Termes"/>
+                <a:ea typeface="Tex Gyre Termes"/>
+                <a:cs typeface="Tex Gyre Termes"/>
+                <a:sym typeface="Tex Gyre Termes"/>
+              </a:rPr>
+              <a:t>haber</a:t>
+            </a:r>
+            <a:r>
+              <a:rPr lang="en-US" sz="1900" dirty="0">
+                <a:solidFill>
+                  <a:srgbClr val="000000"/>
+                </a:solidFill>
+                <a:latin typeface="Tex Gyre Termes"/>
+                <a:ea typeface="Tex Gyre Termes"/>
+                <a:cs typeface="Tex Gyre Termes"/>
+                <a:sym typeface="Tex Gyre Termes"/>
+              </a:rPr>
+              <a:t> </a:t>
+            </a:r>
+            <a:r>
+              <a:rPr lang="en-US" sz="1900" dirty="0" err="1">
+                <a:solidFill>
+                  <a:srgbClr val="000000"/>
+                </a:solidFill>
+                <a:latin typeface="Tex Gyre Termes"/>
+                <a:ea typeface="Tex Gyre Termes"/>
+                <a:cs typeface="Tex Gyre Termes"/>
+                <a:sym typeface="Tex Gyre Termes"/>
+              </a:rPr>
+              <a:t>participado</a:t>
+            </a:r>
+            <a:r>
+              <a:rPr lang="en-US" sz="1900" dirty="0">
+                <a:solidFill>
+                  <a:srgbClr val="000000"/>
+                </a:solidFill>
+                <a:latin typeface="Tex Gyre Termes"/>
+                <a:ea typeface="Tex Gyre Termes"/>
+                <a:cs typeface="Tex Gyre Termes"/>
+                <a:sym typeface="Tex Gyre Termes"/>
+              </a:rPr>
+              <a:t> </a:t>
+            </a:r>
+            <a:r>
+              <a:rPr lang="en-US" sz="1900" dirty="0" err="1">
+                <a:solidFill>
+                  <a:srgbClr val="000000"/>
+                </a:solidFill>
+                <a:latin typeface="Tex Gyre Termes"/>
+                <a:ea typeface="Tex Gyre Termes"/>
+                <a:cs typeface="Tex Gyre Termes"/>
+                <a:sym typeface="Tex Gyre Termes"/>
+              </a:rPr>
+              <a:t>en</a:t>
+            </a:r>
+            <a:r>
+              <a:rPr lang="en-US" sz="1900" dirty="0">
+                <a:solidFill>
+                  <a:srgbClr val="000000"/>
+                </a:solidFill>
+                <a:latin typeface="Tex Gyre Termes"/>
+                <a:ea typeface="Tex Gyre Termes"/>
+                <a:cs typeface="Tex Gyre Termes"/>
+                <a:sym typeface="Tex Gyre Termes"/>
+              </a:rPr>
+              <a:t> </a:t>
+            </a:r>
+            <a:r>
+              <a:rPr lang="en-US" sz="1900" dirty="0" err="1">
+                <a:solidFill>
+                  <a:srgbClr val="000000"/>
+                </a:solidFill>
+                <a:latin typeface="Tex Gyre Termes"/>
+                <a:ea typeface="Tex Gyre Termes"/>
+                <a:cs typeface="Tex Gyre Termes"/>
+                <a:sym typeface="Tex Gyre Termes"/>
+              </a:rPr>
+              <a:t>el</a:t>
+            </a:r>
+            <a:r>
+              <a:rPr lang="en-US" sz="1900" dirty="0">
+                <a:solidFill>
+                  <a:srgbClr val="000000"/>
+                </a:solidFill>
+                <a:latin typeface="Tex Gyre Termes"/>
+                <a:ea typeface="Tex Gyre Termes"/>
+                <a:cs typeface="Tex Gyre Termes"/>
+                <a:sym typeface="Tex Gyre Termes"/>
+              </a:rPr>
+              <a:t> </a:t>
+            </a:r>
+            <a:r>
+              <a:rPr lang="en-US" sz="1900" dirty="0" err="1">
+                <a:solidFill>
+                  <a:schemeClr val="bg1"/>
+                </a:solidFill>
+                <a:latin typeface="Tex Gyre Termes"/>
+                <a:ea typeface="Tex Gyre Termes"/>
+                <a:cs typeface="Tex Gyre Termes"/>
+                <a:sym typeface="Tex Gyre Termes"/>
+              </a:rPr>
+              <a:t>diplomado</a:t>
+            </a:r>
+            <a:r>
+              <a:rPr lang="en-US" sz="1900" dirty="0">
+                <a:solidFill>
+                  <a:srgbClr val="000000"/>
+                </a:solidFill>
+                <a:latin typeface="Tex Gyre Termes"/>
+                <a:ea typeface="Tex Gyre Termes"/>
+                <a:cs typeface="Tex Gyre Termes"/>
+                <a:sym typeface="Tex Gyre Termes"/>
+              </a:rPr>
+              <a:t> de </a:t>
             </a:r>
           </a:p>
           <a:p>
@@ -3461,16 +3668,16 @@
               </a:lnSpc>
             </a:pPr>
             <a:r>
-              <a:rPr lang="en-US" sz="2099" b="true">
-                <a:solidFill>
-                  <a:srgbClr val="000000"/>
+              <a:rPr lang="en-US" sz="1900" b="1" dirty="0">
+                <a:solidFill>
+                  <a:schemeClr val="bg1"/>
                 </a:solidFill>
                 <a:latin typeface="Tex Gyre Termes Bold"/>
                 <a:ea typeface="Tex Gyre Termes Bold"/>
                 <a:cs typeface="Tex Gyre Termes Bold"/>
                 <a:sym typeface="Tex Gyre Termes Bold"/>
               </a:rPr>
-              <a:t> </a:t>
+              <a:t>INOCUIDAD DE ALIMENTOS </a:t>
             </a:r>
           </a:p>
           <a:p>
@@ -3480,7 +3687,7 @@
               </a:lnSpc>
             </a:pPr>
             <a:r>
-              <a:rPr lang="en-US" sz="2099">
+              <a:rPr lang="en-US" sz="1900" dirty="0" err="1">
                 <a:solidFill>
                   <a:srgbClr val="000000"/>
                 </a:solidFill>
@@ -3489,10 +3696,46 @@
                 <a:cs typeface="Tex Gyre Termes"/>
                 <a:sym typeface="Tex Gyre Termes"/>
               </a:rPr>
-              <a:t>Impartido por la </a:t>
-            </a:r>
-            <a:r>
-              <a:rPr lang="en-US" sz="2099" b="true">
+              <a:t>Impartido</a:t>
+            </a:r>
+            <a:r>
+              <a:rPr lang="en-US" sz="1900" dirty="0">
+                <a:solidFill>
+                  <a:srgbClr val="000000"/>
+                </a:solidFill>
+                <a:latin typeface="Tex Gyre Termes"/>
+                <a:ea typeface="Tex Gyre Termes"/>
+                <a:cs typeface="Tex Gyre Termes"/>
+                <a:sym typeface="Tex Gyre Termes"/>
+              </a:rPr>
+              <a:t> </a:t>
+            </a:r>
+            <a:r>
+              <a:rPr lang="en-US" sz="1900" dirty="0" err="1">
+                <a:solidFill>
+                  <a:srgbClr val="000000"/>
+                </a:solidFill>
+                <a:latin typeface="Tex Gyre Termes"/>
+                <a:ea typeface="Tex Gyre Termes"/>
+                <a:cs typeface="Tex Gyre Termes"/>
+                <a:sym typeface="Tex Gyre Termes"/>
+              </a:rPr>
+              <a:t>por</a:t>
+            </a:r>
+            <a:r>
+              <a:rPr lang="en-US" sz="1900" dirty="0">
+                <a:solidFill>
+                  <a:srgbClr val="000000"/>
+                </a:solidFill>
+                <a:latin typeface="Tex Gyre Termes"/>
+                <a:ea typeface="Tex Gyre Termes"/>
+                <a:cs typeface="Tex Gyre Termes"/>
+                <a:sym typeface="Tex Gyre Termes"/>
+              </a:rPr>
+              <a:t> la </a:t>
+            </a:r>
+            <a:r>
+              <a:rPr lang="en-US" sz="1900" b="1" dirty="0" err="1">
                 <a:solidFill>
                   <a:srgbClr val="000000"/>
                 </a:solidFill>
@@ -3501,10 +3744,22 @@
                 <a:cs typeface="Tex Gyre Termes Bold"/>
                 <a:sym typeface="Tex Gyre Termes Bold"/>
               </a:rPr>
-              <a:t>Facultad de Ingeniería</a:t>
-            </a:r>
-            <a:r>
-              <a:rPr lang="en-US" sz="2099">
+              <a:t>Facultad</a:t>
+            </a:r>
+            <a:r>
+              <a:rPr lang="en-US" sz="1900" b="1" dirty="0">
+                <a:solidFill>
+                  <a:srgbClr val="000000"/>
+                </a:solidFill>
+                <a:latin typeface="Tex Gyre Termes Bold"/>
+                <a:ea typeface="Tex Gyre Termes Bold"/>
+                <a:cs typeface="Tex Gyre Termes Bold"/>
+                <a:sym typeface="Tex Gyre Termes Bold"/>
+              </a:rPr>
+              <a:t> de Ingeniería</a:t>
+            </a:r>
+            <a:r>
+              <a:rPr lang="en-US" sz="1900" dirty="0">
                 <a:solidFill>
                   <a:srgbClr val="000000"/>
                 </a:solidFill>
@@ -3513,7 +3768,91 @@
                 <a:cs typeface="Tex Gyre Termes"/>
                 <a:sym typeface="Tex Gyre Termes"/>
               </a:rPr>
-              <a:t>, a través del                                                           </a:t>
+              <a:t>, a </a:t>
+            </a:r>
+            <a:r>
+              <a:rPr lang="en-US" sz="1900" dirty="0" err="1">
+                <a:solidFill>
+                  <a:srgbClr val="000000"/>
+                </a:solidFill>
+                <a:latin typeface="Tex Gyre Termes"/>
+                <a:ea typeface="Tex Gyre Termes"/>
+                <a:cs typeface="Tex Gyre Termes"/>
+                <a:sym typeface="Tex Gyre Termes"/>
+              </a:rPr>
+              <a:t>través</a:t>
+            </a:r>
+            <a:r>
+              <a:rPr lang="en-US" sz="1900" dirty="0">
+                <a:solidFill>
+                  <a:srgbClr val="000000"/>
+                </a:solidFill>
+                <a:latin typeface="Tex Gyre Termes"/>
+                <a:ea typeface="Tex Gyre Termes"/>
+                <a:cs typeface="Tex Gyre Termes"/>
+                <a:sym typeface="Tex Gyre Termes"/>
+              </a:rPr>
+              <a:t> del </a:t>
+            </a:r>
+            <a:r>
+              <a:rPr lang="en-US" sz="1900" dirty="0">
+                <a:solidFill>
+                  <a:schemeClr val="bg1"/>
+                </a:solidFill>
+                <a:latin typeface="Tex Gyre Termes"/>
+                <a:ea typeface="Tex Gyre Termes"/>
+                <a:cs typeface="Tex Gyre Termes"/>
+                <a:sym typeface="Tex Gyre Termes"/>
+              </a:rPr>
+              <a:t>Departamento de </a:t>
+            </a:r>
+            <a:r>
+              <a:rPr lang="en-US" sz="1900" dirty="0" err="1">
+                <a:solidFill>
+                  <a:schemeClr val="bg1"/>
+                </a:solidFill>
+                <a:latin typeface="Tex Gyre Termes"/>
+                <a:ea typeface="Tex Gyre Termes"/>
+                <a:cs typeface="Tex Gyre Termes"/>
+                <a:sym typeface="Tex Gyre Termes"/>
+              </a:rPr>
+              <a:t>Ingenier</a:t>
+            </a:r>
+            <a:r>
+              <a:rPr lang="es-HN" sz="1900" dirty="0" err="1">
+                <a:solidFill>
+                  <a:schemeClr val="bg1"/>
+                </a:solidFill>
+                <a:latin typeface="Tex Gyre Termes"/>
+                <a:ea typeface="Tex Gyre Termes"/>
+                <a:cs typeface="Tex Gyre Termes"/>
+                <a:sym typeface="Tex Gyre Termes"/>
+              </a:rPr>
+              <a:t>ía</a:t>
+            </a:r>
+            <a:r>
+              <a:rPr lang="es-HN" sz="1900" dirty="0">
+                <a:solidFill>
+                  <a:schemeClr val="bg1"/>
+                </a:solidFill>
+                <a:latin typeface="Tex Gyre Termes"/>
+                <a:ea typeface="Tex Gyre Termes"/>
+                <a:cs typeface="Tex Gyre Termes"/>
+                <a:sym typeface="Tex Gyre Termes"/>
+              </a:rPr>
+              <a:t> Química</a:t>
+            </a:r>
+            <a:r>
+              <a:rPr lang="en-US" sz="1900" dirty="0">
+                <a:solidFill>
+                  <a:schemeClr val="bg1"/>
+                </a:solidFill>
+                <a:latin typeface="Tex Gyre Termes"/>
+                <a:ea typeface="Tex Gyre Termes"/>
+                <a:cs typeface="Tex Gyre Termes"/>
+                <a:sym typeface="Tex Gyre Termes"/>
+              </a:rPr>
+              <a:t>                                                         </a:t>
             </a:r>
           </a:p>
           <a:p>
@@ -3526,7 +3865,7 @@
               </a:spcBef>
             </a:pPr>
             <a:r>
-              <a:rPr lang="en-US" sz="2099">
+              <a:rPr lang="en-US" sz="1900" dirty="0">
                 <a:solidFill>
                   <a:srgbClr val="000000"/>
                 </a:solidFill>
@@ -3538,7 +3877,7 @@
               <a:t> y la </a:t>
             </a:r>
             <a:r>
-              <a:rPr lang="en-US" b="true" sz="2099">
+              <a:rPr lang="en-US" sz="1900" b="1" dirty="0" err="1">
                 <a:solidFill>
                   <a:srgbClr val="000000"/>
                 </a:solidFill>
@@ -3547,10 +3886,34 @@
                 <a:cs typeface="Tex Gyre Termes Bold"/>
                 <a:sym typeface="Tex Gyre Termes Bold"/>
               </a:rPr>
-              <a:t>Coordinación de Vinculación</a:t>
-            </a:r>
-            <a:r>
-              <a:rPr lang="en-US" sz="2099">
+              <a:t>Coordinación</a:t>
+            </a:r>
+            <a:r>
+              <a:rPr lang="en-US" sz="1900" b="1" dirty="0">
+                <a:solidFill>
+                  <a:srgbClr val="000000"/>
+                </a:solidFill>
+                <a:latin typeface="Tex Gyre Termes Bold"/>
+                <a:ea typeface="Tex Gyre Termes Bold"/>
+                <a:cs typeface="Tex Gyre Termes Bold"/>
+                <a:sym typeface="Tex Gyre Termes Bold"/>
+              </a:rPr>
+              <a:t> de </a:t>
+            </a:r>
+            <a:r>
+              <a:rPr lang="en-US" sz="1900" b="1" dirty="0" err="1">
+                <a:solidFill>
+                  <a:srgbClr val="000000"/>
+                </a:solidFill>
+                <a:latin typeface="Tex Gyre Termes Bold"/>
+                <a:ea typeface="Tex Gyre Termes Bold"/>
+                <a:cs typeface="Tex Gyre Termes Bold"/>
+                <a:sym typeface="Tex Gyre Termes Bold"/>
+              </a:rPr>
+              <a:t>Vinculación</a:t>
+            </a:r>
+            <a:r>
+              <a:rPr lang="en-US" sz="1900" dirty="0">
                 <a:solidFill>
                   <a:srgbClr val="000000"/>
                 </a:solidFill>
@@ -3559,19 +3922,88 @@
                 <a:cs typeface="Tex Gyre Termes"/>
                 <a:sym typeface="Tex Gyre Termes"/>
               </a:rPr>
-              <a:t>, con una duración total de </a:t>
-            </a:r>
-          </a:p>
-        </p:txBody>
-      </p:sp>
-      <p:sp>
-        <p:nvSpPr>
-          <p:cNvPr name="Freeform 10" id="10"/>
+              <a:t>, con </a:t>
+            </a:r>
+            <a:r>
+              <a:rPr lang="en-US" sz="1900" dirty="0" err="1">
+                <a:solidFill>
+                  <a:srgbClr val="000000"/>
+                </a:solidFill>
+                <a:latin typeface="Tex Gyre Termes"/>
+                <a:ea typeface="Tex Gyre Termes"/>
+                <a:cs typeface="Tex Gyre Termes"/>
+                <a:sym typeface="Tex Gyre Termes"/>
+              </a:rPr>
+              <a:t>una</a:t>
+            </a:r>
+            <a:r>
+              <a:rPr lang="en-US" sz="1900" dirty="0">
+                <a:solidFill>
+                  <a:srgbClr val="000000"/>
+                </a:solidFill>
+                <a:latin typeface="Tex Gyre Termes"/>
+                <a:ea typeface="Tex Gyre Termes"/>
+                <a:cs typeface="Tex Gyre Termes"/>
+                <a:sym typeface="Tex Gyre Termes"/>
+              </a:rPr>
+              <a:t> </a:t>
+            </a:r>
+            <a:r>
+              <a:rPr lang="en-US" sz="1900" dirty="0" err="1">
+                <a:solidFill>
+                  <a:srgbClr val="000000"/>
+                </a:solidFill>
+                <a:latin typeface="Tex Gyre Termes"/>
+                <a:ea typeface="Tex Gyre Termes"/>
+                <a:cs typeface="Tex Gyre Termes"/>
+                <a:sym typeface="Tex Gyre Termes"/>
+              </a:rPr>
+              <a:t>duración</a:t>
+            </a:r>
+            <a:r>
+              <a:rPr lang="en-US" sz="1900" dirty="0">
+                <a:solidFill>
+                  <a:srgbClr val="000000"/>
+                </a:solidFill>
+                <a:latin typeface="Tex Gyre Termes"/>
+                <a:ea typeface="Tex Gyre Termes"/>
+                <a:cs typeface="Tex Gyre Termes"/>
+                <a:sym typeface="Tex Gyre Termes"/>
+              </a:rPr>
+              <a:t> total de </a:t>
+            </a:r>
+            <a:r>
+              <a:rPr lang="en-US" sz="1900">
+                <a:solidFill>
+                  <a:schemeClr val="bg1"/>
+                </a:solidFill>
+                <a:latin typeface="Tex Gyre Termes"/>
+                <a:ea typeface="Tex Gyre Termes"/>
+                <a:cs typeface="Tex Gyre Termes"/>
+                <a:sym typeface="Tex Gyre Termes"/>
+              </a:rPr>
+              <a:t>40 horas</a:t>
+            </a:r>
+            <a:endParaRPr lang="en-US" sz="1900" dirty="0">
+              <a:solidFill>
+                <a:srgbClr val="000000"/>
+              </a:solidFill>
+              <a:latin typeface="Tex Gyre Termes"/>
+              <a:ea typeface="Tex Gyre Termes"/>
+              <a:cs typeface="Tex Gyre Termes"/>
+              <a:sym typeface="Tex Gyre Termes"/>
+            </a:endParaRPr>
+          </a:p>
+        </p:txBody>
+      </p:sp>
+      <p:sp>
+        <p:nvSpPr>
+          <p:cNvPr id="10" name="Freeform 10"/>
           <p:cNvSpPr/>
           <p:nvPr/>
         </p:nvSpPr>
         <p:spPr>
-          <a:xfrm flipH="false" flipV="false" rot="0">
+          <a:xfrm>
             <a:off x="5045479" y="232035"/>
             <a:ext cx="601042" cy="903930"/>
           </a:xfrm>
@@ -3580,9 +4012,9 @@
             <a:gdLst/>
             <a:ahLst/>
             <a:cxnLst/>
-            <a:rect r="r" b="b" t="t" l="l"/>
+            <a:rect l="l" t="t" r="r" b="b"/>
             <a:pathLst>
-              <a:path h="903930" w="601042">
+              <a:path w="601042" h="903930">
                 <a:moveTo>
                   <a:pt x="0" y="0"/>
                 </a:moveTo>
@@ -3605,19 +4037,26 @@
           <a:blipFill>
             <a:blip r:embed="rId4"/>
             <a:stretch>
-              <a:fillRect l="0" t="0" r="0" b="0"/>
+              <a:fillRect/>
             </a:stretch>
           </a:blipFill>
         </p:spPr>
-      </p:sp>
-      <p:sp>
-        <p:nvSpPr>
-          <p:cNvPr name="Freeform 11" id="11"/>
+        <p:txBody>
+          <a:bodyPr/>
+          <a:lstStyle/>
+          <a:p>
+            <a:endParaRPr lang="es-HN"/>
+          </a:p>
+        </p:txBody>
+      </p:sp>
+      <p:sp>
+        <p:nvSpPr>
+          <p:cNvPr id="11" name="Freeform 11"/>
           <p:cNvSpPr/>
           <p:nvPr/>
         </p:nvSpPr>
         <p:spPr>
-          <a:xfrm flipH="false" flipV="false" rot="0">
+          <a:xfrm>
             <a:off x="9059665" y="304035"/>
             <a:ext cx="917343" cy="903930"/>
           </a:xfrm>
@@ -3626,9 +4065,9 @@
             <a:gdLst/>
             <a:ahLst/>
             <a:cxnLst/>
-            <a:rect r="r" b="b" t="t" l="l"/>
+            <a:rect l="l" t="t" r="r" b="b"/>
             <a:pathLst>
-              <a:path h="903930" w="917343">
+              <a:path w="917343" h="903930">
                 <a:moveTo>
                   <a:pt x="0" y="0"/>
                 </a:moveTo>
@@ -3655,24 +4094,31 @@
             </a:stretch>
           </a:blipFill>
         </p:spPr>
-      </p:sp>
-      <p:sp>
-        <p:nvSpPr>
-          <p:cNvPr name="TextBox 12" id="12"/>
-          <p:cNvSpPr txBox="true"/>
+        <p:txBody>
+          <a:bodyPr/>
+          <a:lstStyle/>
+          <a:p>
+            <a:endParaRPr lang="es-HN"/>
+          </a:p>
+        </p:txBody>
+      </p:sp>
+      <p:sp>
+        <p:nvSpPr>
+          <p:cNvPr id="12" name="TextBox 12"/>
+          <p:cNvSpPr txBox="1"/>
           <p:nvPr/>
         </p:nvSpPr>
         <p:spPr>
-          <a:xfrm rot="0">
+          <a:xfrm>
             <a:off x="2204960" y="6881294"/>
-            <a:ext cx="2113928" cy="328752"/>
+            <a:ext cx="2113928" cy="342401"/>
           </a:xfrm>
           <a:prstGeom prst="rect">
             <a:avLst/>
           </a:prstGeom>
         </p:spPr>
         <p:txBody>
-          <a:bodyPr anchor="t" rtlCol="false" tIns="0" lIns="0" bIns="0" rIns="0">
+          <a:bodyPr lIns="0" tIns="0" rIns="0" bIns="0" rtlCol="0" anchor="t">
             <a:spAutoFit/>
           </a:bodyPr>
           <a:lstStyle/>
@@ -3683,17 +4129,50 @@
               </a:lnSpc>
             </a:pPr>
             <a:r>
-              <a:rPr lang="en-US" sz="1317">
-                <a:solidFill>
-                  <a:srgbClr val="000000"/>
+              <a:rPr lang="en-US" sz="1317" dirty="0" err="1">
+                <a:solidFill>
+                  <a:schemeClr val="bg1"/>
                 </a:solidFill>
                 <a:latin typeface="Asangha"/>
                 <a:ea typeface="Asangha"/>
                 <a:cs typeface="Asangha"/>
                 <a:sym typeface="Asangha"/>
               </a:rPr>
-              <a:t>Coordinadora Académica</a:t>
-            </a:r>
+              <a:t>Coordinadora</a:t>
+            </a:r>
+            <a:r>
+              <a:rPr lang="en-US" sz="1317" dirty="0">
+                <a:solidFill>
+                  <a:schemeClr val="bg1"/>
+                </a:solidFill>
+                <a:latin typeface="Asangha"/>
+                <a:ea typeface="Asangha"/>
+                <a:cs typeface="Asangha"/>
+                <a:sym typeface="Asangha"/>
+              </a:rPr>
+              <a:t> </a:t>
+            </a:r>
+            <a:r>
+              <a:rPr lang="en-US" sz="1317" dirty="0" err="1">
+                <a:solidFill>
+                  <a:schemeClr val="bg1"/>
+                </a:solidFill>
+                <a:latin typeface="Asangha"/>
+                <a:ea typeface="Asangha"/>
+                <a:cs typeface="Asangha"/>
+                <a:sym typeface="Asangha"/>
+              </a:rPr>
+              <a:t>Académica</a:t>
+            </a:r>
+            <a:endParaRPr lang="en-US" sz="1317" dirty="0">
+              <a:solidFill>
+                <a:schemeClr val="bg1"/>
+              </a:solidFill>
+              <a:latin typeface="Asangha"/>
+              <a:ea typeface="Asangha"/>
+              <a:cs typeface="Asangha"/>
+              <a:sym typeface="Asangha"/>
+            </a:endParaRPr>
           </a:p>
           <a:p>
             <a:pPr algn="ctr">
@@ -3702,37 +4181,73 @@
               </a:lnSpc>
             </a:pPr>
             <a:r>
-              <a:rPr lang="en-US" sz="1317">
-                <a:solidFill>
-                  <a:srgbClr val="000000"/>
+              <a:rPr lang="en-US" sz="1317" dirty="0" err="1">
+                <a:solidFill>
+                  <a:schemeClr val="bg1"/>
                 </a:solidFill>
                 <a:latin typeface="Asangha"/>
                 <a:ea typeface="Asangha"/>
                 <a:cs typeface="Asangha"/>
                 <a:sym typeface="Asangha"/>
               </a:rPr>
-              <a:t>Coordinadora de Vinculación </a:t>
-            </a:r>
-          </a:p>
-        </p:txBody>
-      </p:sp>
-      <p:sp>
-        <p:nvSpPr>
-          <p:cNvPr name="TextBox 13" id="13"/>
-          <p:cNvSpPr txBox="true"/>
+              <a:t>Coordinadora</a:t>
+            </a:r>
+            <a:r>
+              <a:rPr lang="en-US" sz="1317" dirty="0">
+                <a:solidFill>
+                  <a:schemeClr val="bg1"/>
+                </a:solidFill>
+                <a:latin typeface="Asangha"/>
+                <a:ea typeface="Asangha"/>
+                <a:cs typeface="Asangha"/>
+                <a:sym typeface="Asangha"/>
+              </a:rPr>
+              <a:t> de </a:t>
+            </a:r>
+            <a:r>
+              <a:rPr lang="en-US" sz="1317" dirty="0" err="1">
+                <a:solidFill>
+                  <a:schemeClr val="bg1"/>
+                </a:solidFill>
+                <a:latin typeface="Asangha"/>
+                <a:ea typeface="Asangha"/>
+                <a:cs typeface="Asangha"/>
+                <a:sym typeface="Asangha"/>
+              </a:rPr>
+              <a:t>Vinculación</a:t>
+            </a:r>
+            <a:r>
+              <a:rPr lang="en-US" sz="1317" dirty="0">
+                <a:solidFill>
+                  <a:schemeClr val="bg1"/>
+                </a:solidFill>
+                <a:latin typeface="Asangha"/>
+                <a:ea typeface="Asangha"/>
+                <a:cs typeface="Asangha"/>
+                <a:sym typeface="Asangha"/>
+              </a:rPr>
+              <a:t> </a:t>
+            </a:r>
+          </a:p>
+        </p:txBody>
+      </p:sp>
+      <p:sp>
+        <p:nvSpPr>
+          <p:cNvPr id="13" name="TextBox 13"/>
+          <p:cNvSpPr txBox="1"/>
           <p:nvPr/>
         </p:nvSpPr>
         <p:spPr>
-          <a:xfrm rot="0">
+          <a:xfrm>
             <a:off x="2037111" y="6537678"/>
-            <a:ext cx="2449626" cy="283745"/>
+            <a:ext cx="2449626" cy="307777"/>
           </a:xfrm>
           <a:prstGeom prst="rect">
             <a:avLst/>
           </a:prstGeom>
         </p:spPr>
         <p:txBody>
-          <a:bodyPr anchor="t" rtlCol="false" tIns="0" lIns="0" bIns="0" rIns="0">
+          <a:bodyPr lIns="0" tIns="0" rIns="0" bIns="0" rtlCol="0" anchor="t">
             <a:spAutoFit/>
           </a:bodyPr>
           <a:lstStyle/>
@@ -3743,9 +4258,9 @@
               </a:lnSpc>
             </a:pPr>
             <a:r>
-              <a:rPr lang="en-US" sz="1439">
-                <a:solidFill>
-                  <a:srgbClr val="000000"/>
+              <a:rPr lang="en-US" sz="1439" dirty="0">
+                <a:solidFill>
+                  <a:schemeClr val="bg1"/>
                 </a:solidFill>
                 <a:latin typeface="Asangha"/>
                 <a:ea typeface="Asangha"/>
@@ -3759,61 +4274,75 @@
       </p:sp>
       <p:sp>
         <p:nvSpPr>
-          <p:cNvPr name="AutoShape 14" id="14"/>
+          <p:cNvPr id="14" name="AutoShape 14"/>
           <p:cNvSpPr/>
           <p:nvPr/>
         </p:nvSpPr>
         <p:spPr>
-          <a:xfrm flipV="true">
+          <a:xfrm flipV="1">
             <a:off x="2037119" y="6479479"/>
             <a:ext cx="2768480" cy="4396"/>
           </a:xfrm>
           <a:prstGeom prst="line">
             <a:avLst/>
           </a:prstGeom>
-          <a:ln cap="flat" w="19050">
+          <a:ln w="19050" cap="flat">
             <a:solidFill>
               <a:srgbClr val="000000"/>
             </a:solidFill>
             <a:prstDash val="solid"/>
-            <a:headEnd type="none" len="sm" w="sm"/>
-            <a:tailEnd type="none" len="sm" w="sm"/>
+            <a:headEnd type="none" w="sm" len="sm"/>
+            <a:tailEnd type="none" w="sm" len="sm"/>
           </a:ln>
         </p:spPr>
-      </p:sp>
-      <p:sp>
-        <p:nvSpPr>
-          <p:cNvPr name="AutoShape 15" id="15"/>
+        <p:txBody>
+          <a:bodyPr/>
+          <a:lstStyle/>
+          <a:p>
+            <a:endParaRPr lang="es-HN"/>
+          </a:p>
+        </p:txBody>
+      </p:sp>
+      <p:sp>
+        <p:nvSpPr>
+          <p:cNvPr id="15" name="AutoShape 15"/>
           <p:cNvSpPr/>
           <p:nvPr/>
         </p:nvSpPr>
         <p:spPr>
-          <a:xfrm flipV="true">
+          <a:xfrm flipV="1">
             <a:off x="6088110" y="6493400"/>
             <a:ext cx="2768480" cy="4396"/>
           </a:xfrm>
           <a:prstGeom prst="line">
             <a:avLst/>
           </a:prstGeom>
-          <a:ln cap="flat" w="19050">
+          <a:ln w="19050" cap="flat">
             <a:solidFill>
               <a:srgbClr val="000000"/>
             </a:solidFill>
             <a:prstDash val="solid"/>
-            <a:headEnd type="none" len="sm" w="sm"/>
-            <a:tailEnd type="none" len="sm" w="sm"/>
+            <a:headEnd type="none" w="sm" len="sm"/>
+            <a:tailEnd type="none" w="sm" len="sm"/>
           </a:ln>
         </p:spPr>
-      </p:sp>
-      <p:sp>
-        <p:nvSpPr>
-          <p:cNvPr name="TextBox 16" id="16"/>
-          <p:cNvSpPr txBox="true"/>
+        <p:txBody>
+          <a:bodyPr/>
+          <a:lstStyle/>
+          <a:p>
+            <a:endParaRPr lang="es-HN"/>
+          </a:p>
+        </p:txBody>
+      </p:sp>
+      <p:sp>
+        <p:nvSpPr>
+          <p:cNvPr id="16" name="TextBox 16"/>
+          <p:cNvSpPr txBox="1"/>
           <p:nvPr/>
         </p:nvSpPr>
         <p:spPr>
-          <a:xfrm rot="0">
-            <a:off x="1271374" y="5049493"/>
+          <a:xfrm>
+            <a:off x="1271371" y="5066268"/>
             <a:ext cx="8149253" cy="392431"/>
           </a:xfrm>
           <a:prstGeom prst="rect">
@@ -3821,12 +4350,12 @@
           </a:prstGeom>
         </p:spPr>
         <p:txBody>
-          <a:bodyPr anchor="t" rtlCol="false" tIns="0" lIns="0" bIns="0" rIns="0">
+          <a:bodyPr lIns="0" tIns="0" rIns="0" bIns="0" rtlCol="0" anchor="t">
             <a:spAutoFit/>
           </a:bodyPr>
           <a:lstStyle/>
           <a:p>
-            <a:pPr algn="ctr" marL="0" indent="0" lvl="0">
+            <a:pPr marL="0" lvl="0" indent="0" algn="ctr">
               <a:lnSpc>
                 <a:spcPts val="3359"/>
               </a:lnSpc>
@@ -3835,7 +4364,7 @@
               </a:spcBef>
             </a:pPr>
             <a:r>
-              <a:rPr lang="en-US" sz="1999">
+              <a:rPr lang="en-US" sz="1900" dirty="0">
                 <a:solidFill>
                   <a:srgbClr val="000000"/>
                 </a:solidFill>
@@ -3844,22 +4373,22 @@
                 <a:cs typeface="Tex Gyre Termes"/>
                 <a:sym typeface="Tex Gyre Termes"/>
               </a:rPr>
-              <a:t>Dado en Ciudad Universitaria, Tegucigalpa, MDC, </a:t>
-            </a:r>
-            <a:r>
-              <a:rPr lang="en-US" sz="1999">
-                <a:solidFill>
-                  <a:srgbClr val="FFFFFF"/>
+              <a:t>Dado </a:t>
+            </a:r>
+            <a:r>
+              <a:rPr lang="en-US" sz="1900" dirty="0" err="1">
+                <a:solidFill>
+                  <a:srgbClr val="000000"/>
                 </a:solidFill>
                 <a:latin typeface="Tex Gyre Termes"/>
                 <a:ea typeface="Tex Gyre Termes"/>
                 <a:cs typeface="Tex Gyre Termes"/>
                 <a:sym typeface="Tex Gyre Termes"/>
               </a:rPr>
-              <a:t>el 30 de mayo del año 2025</a:t>
-            </a:r>
-            <a:r>
-              <a:rPr lang="en-US" sz="1999">
+              <a:t>en</a:t>
+            </a:r>
+            <a:r>
+              <a:rPr lang="en-US" sz="1900" dirty="0">
                 <a:solidFill>
                   <a:srgbClr val="000000"/>
                 </a:solidFill>
@@ -3868,7 +4397,79 @@
                 <a:cs typeface="Tex Gyre Termes"/>
                 <a:sym typeface="Tex Gyre Termes"/>
               </a:rPr>
-              <a:t>.</a:t>
+              <a:t> Ciudad </a:t>
+            </a:r>
+            <a:r>
+              <a:rPr lang="en-US" sz="1900" dirty="0" err="1">
+                <a:solidFill>
+                  <a:srgbClr val="000000"/>
+                </a:solidFill>
+                <a:latin typeface="Tex Gyre Termes"/>
+                <a:ea typeface="Tex Gyre Termes"/>
+                <a:cs typeface="Tex Gyre Termes"/>
+                <a:sym typeface="Tex Gyre Termes"/>
+              </a:rPr>
+              <a:t>Universitaria</a:t>
+            </a:r>
+            <a:r>
+              <a:rPr lang="en-US" sz="1900" dirty="0">
+                <a:solidFill>
+                  <a:srgbClr val="000000"/>
+                </a:solidFill>
+                <a:latin typeface="Tex Gyre Termes"/>
+                <a:ea typeface="Tex Gyre Termes"/>
+                <a:cs typeface="Tex Gyre Termes"/>
+                <a:sym typeface="Tex Gyre Termes"/>
+              </a:rPr>
+              <a:t>, Tegucigalpa, MDC, </a:t>
+            </a:r>
+            <a:r>
+              <a:rPr lang="en-US" sz="1900" dirty="0" err="1">
+                <a:solidFill>
+                  <a:schemeClr val="bg1"/>
+                </a:solidFill>
+                <a:latin typeface="Tex Gyre Termes"/>
+                <a:ea typeface="Tex Gyre Termes"/>
+                <a:cs typeface="Tex Gyre Termes"/>
+                <a:sym typeface="Tex Gyre Termes"/>
+              </a:rPr>
+              <a:t>el</a:t>
+            </a:r>
+            <a:r>
+              <a:rPr lang="en-US" sz="1900" dirty="0">
+                <a:solidFill>
+                  <a:schemeClr val="bg1"/>
+                </a:solidFill>
+                <a:latin typeface="Tex Gyre Termes"/>
+                <a:ea typeface="Tex Gyre Termes"/>
+                <a:cs typeface="Tex Gyre Termes"/>
+                <a:sym typeface="Tex Gyre Termes"/>
+              </a:rPr>
+              <a:t> 30 de mayo del </a:t>
+            </a:r>
+            <a:r>
+              <a:rPr lang="en-US" sz="1900" dirty="0" err="1">
+                <a:solidFill>
+                  <a:schemeClr val="bg1"/>
+                </a:solidFill>
+                <a:latin typeface="Tex Gyre Termes"/>
+                <a:ea typeface="Tex Gyre Termes"/>
+                <a:cs typeface="Tex Gyre Termes"/>
+                <a:sym typeface="Tex Gyre Termes"/>
+              </a:rPr>
+              <a:t>año</a:t>
+            </a:r>
+            <a:r>
+              <a:rPr lang="en-US" sz="1900" dirty="0">
+                <a:solidFill>
+                  <a:schemeClr val="bg1"/>
+                </a:solidFill>
+                <a:latin typeface="Tex Gyre Termes"/>
+                <a:ea typeface="Tex Gyre Termes"/>
+                <a:cs typeface="Tex Gyre Termes"/>
+                <a:sym typeface="Tex Gyre Termes"/>
+              </a:rPr>
+              <a:t> 2025.</a:t>
             </a:r>
           </a:p>
         </p:txBody>

</xml_diff>

<commit_message>
feat: adding a template
</commit_message>
<xml_diff>
--- a/src/assets/generated/Constancia de participacion_Plantilla.pptx
+++ b/src/assets/generated/Constancia de participacion_Plantilla.pptx
@@ -3973,7 +3973,7 @@
               <a:t> total de </a:t>
             </a:r>
             <a:r>
-              <a:rPr lang="en-US" sz="1900">
+              <a:rPr lang="en-US" sz="1900" dirty="0">
                 <a:solidFill>
                   <a:schemeClr val="bg1"/>
                 </a:solidFill>
@@ -4098,7 +4098,8 @@
           <a:bodyPr/>
           <a:lstStyle/>
           <a:p>
-            <a:endParaRPr lang="es-HN"/>
+            <a:pPr algn="r"/>
+            <a:endParaRPr lang="es-HN" dirty="0"/>
           </a:p>
         </p:txBody>
       </p:sp>
@@ -4279,9 +4280,9 @@
           <p:nvPr/>
         </p:nvSpPr>
         <p:spPr>
-          <a:xfrm flipV="1">
-            <a:off x="2037119" y="6479479"/>
-            <a:ext cx="2768480" cy="4396"/>
+          <a:xfrm>
+            <a:off x="1593931" y="6460540"/>
+            <a:ext cx="2892806" cy="8377"/>
           </a:xfrm>
           <a:prstGeom prst="line">
             <a:avLst/>
@@ -4310,9 +4311,9 @@
           <p:nvPr/>
         </p:nvSpPr>
         <p:spPr>
-          <a:xfrm flipV="1">
-            <a:off x="6088110" y="6493400"/>
-            <a:ext cx="2768480" cy="4396"/>
+          <a:xfrm>
+            <a:off x="6205262" y="6468918"/>
+            <a:ext cx="2892806" cy="0"/>
           </a:xfrm>
           <a:prstGeom prst="line">
             <a:avLst/>

</xml_diff>